<commit_message>
newer version of Crawler & Coding style
</commit_message>
<xml_diff>
--- a/MeetingMinutes/SimianArmy_RelatedFiles/Crawler&CodingStyle.pptx
+++ b/MeetingMinutes/SimianArmy_RelatedFiles/Crawler&CodingStyle.pptx
@@ -5,7 +5,7 @@
     <p:sldMasterId id="2147483659" r:id="rId1"/>
   </p:sldMasterIdLst>
   <p:notesMasterIdLst>
-    <p:notesMasterId r:id="rId23"/>
+    <p:notesMasterId r:id="rId24"/>
   </p:notesMasterIdLst>
   <p:sldIdLst>
     <p:sldId id="256" r:id="rId2"/>
@@ -19,16 +19,17 @@
     <p:sldId id="265" r:id="rId10"/>
     <p:sldId id="277" r:id="rId11"/>
     <p:sldId id="259" r:id="rId12"/>
-    <p:sldId id="267" r:id="rId13"/>
-    <p:sldId id="268" r:id="rId14"/>
-    <p:sldId id="269" r:id="rId15"/>
-    <p:sldId id="271" r:id="rId16"/>
-    <p:sldId id="270" r:id="rId17"/>
-    <p:sldId id="272" r:id="rId18"/>
-    <p:sldId id="274" r:id="rId19"/>
+    <p:sldId id="271" r:id="rId13"/>
+    <p:sldId id="278" r:id="rId14"/>
+    <p:sldId id="279" r:id="rId15"/>
+    <p:sldId id="270" r:id="rId16"/>
+    <p:sldId id="272" r:id="rId17"/>
+    <p:sldId id="274" r:id="rId18"/>
+    <p:sldId id="281" r:id="rId19"/>
     <p:sldId id="273" r:id="rId20"/>
-    <p:sldId id="275" r:id="rId21"/>
-    <p:sldId id="276" r:id="rId22"/>
+    <p:sldId id="282" r:id="rId21"/>
+    <p:sldId id="280" r:id="rId22"/>
+    <p:sldId id="276" r:id="rId23"/>
   </p:sldIdLst>
   <p:sldSz cx="9144000" cy="5143500" type="screen16x9"/>
   <p:notesSz cx="6858000" cy="9144000"/>
@@ -4890,7 +4891,7 @@
           <a:p>
             <a:r>
               <a:rPr lang="en-US" altLang="zh-TW" dirty="0" smtClean="0"/>
-              <a:t>Architecture</a:t>
+              <a:t>Class Diagram</a:t>
             </a:r>
             <a:endParaRPr lang="zh-TW" altLang="en-US" dirty="0"/>
           </a:p>
@@ -4966,8 +4967,38 @@
         </p:blipFill>
         <p:spPr>
           <a:xfrm>
-            <a:off x="2563246" y="414105"/>
+            <a:off x="2752103" y="414105"/>
             <a:ext cx="6269054" cy="4445911"/>
+          </a:xfrm>
+          <a:prstGeom prst="rect">
+            <a:avLst/>
+          </a:prstGeom>
+        </p:spPr>
+      </p:pic>
+      <p:pic>
+        <p:nvPicPr>
+          <p:cNvPr id="5" name="圖片 4"/>
+          <p:cNvPicPr>
+            <a:picLocks noChangeAspect="1"/>
+          </p:cNvPicPr>
+          <p:nvPr/>
+        </p:nvPicPr>
+        <p:blipFill>
+          <a:blip r:embed="rId3">
+            <a:extLst>
+              <a:ext uri="{28A0092B-C50C-407E-A947-70E740481C1C}">
+                <a14:useLocalDpi xmlns:a14="http://schemas.microsoft.com/office/drawing/2010/main" val="0"/>
+              </a:ext>
+            </a:extLst>
+          </a:blip>
+          <a:stretch>
+            <a:fillRect/>
+          </a:stretch>
+        </p:blipFill>
+        <p:spPr>
+          <a:xfrm>
+            <a:off x="534206" y="2067793"/>
+            <a:ext cx="1995392" cy="1662544"/>
           </a:xfrm>
           <a:prstGeom prst="rect">
             <a:avLst/>
@@ -5027,10 +5058,16 @@
           <a:lstStyle/>
           <a:p>
             <a:r>
-              <a:rPr lang="en-US" altLang="zh-TW" dirty="0" smtClean="0"/>
+              <a:rPr lang="en-US" altLang="zh-TW" dirty="0" smtClean="0">
+                <a:latin typeface="Miriam" panose="020B0502050101010101" pitchFamily="34" charset="-79"/>
+                <a:cs typeface="Miriam" panose="020B0502050101010101" pitchFamily="34" charset="-79"/>
+              </a:rPr>
               <a:t>Question 1</a:t>
             </a:r>
-            <a:endParaRPr lang="zh-TW" altLang="en-US" dirty="0"/>
+            <a:endParaRPr lang="zh-TW" altLang="en-US" dirty="0">
+              <a:latin typeface="Miriam" panose="020B0502050101010101" pitchFamily="34" charset="-79"/>
+              <a:cs typeface="Miriam" panose="020B0502050101010101" pitchFamily="34" charset="-79"/>
+            </a:endParaRPr>
           </a:p>
         </p:txBody>
       </p:sp>
@@ -5054,25 +5091,43 @@
               <a:buChar char="Ø"/>
             </a:pPr>
             <a:r>
-              <a:rPr lang="zh-TW" altLang="en-US" dirty="0" smtClean="0"/>
-              <a:t>為什麼每一種</a:t>
+              <a:rPr lang="en-US" altLang="zh-TW" dirty="0" smtClean="0">
+                <a:latin typeface="Miriam" panose="020B0502050101010101" pitchFamily="34" charset="-79"/>
+                <a:cs typeface="Miriam" panose="020B0502050101010101" pitchFamily="34" charset="-79"/>
+              </a:rPr>
+              <a:t>Why do each cloud service need a corresponding crawler?</a:t>
+            </a:r>
+          </a:p>
+          <a:p>
+            <a:pPr marL="285750" indent="-285750">
+              <a:buFont typeface="Wingdings" panose="05000000000000000000" pitchFamily="2" charset="2"/>
+              <a:buChar char="Ø"/>
+            </a:pPr>
+            <a:r>
+              <a:rPr lang="en-US" altLang="zh-TW" dirty="0" smtClean="0">
+                <a:latin typeface="Miriam" panose="020B0502050101010101" pitchFamily="34" charset="-79"/>
+                <a:cs typeface="Miriam" panose="020B0502050101010101" pitchFamily="34" charset="-79"/>
+              </a:rPr>
+              <a:t>Any way to increase </a:t>
             </a:r>
             <a:r>
-              <a:rPr lang="en-US" altLang="zh-TW" dirty="0" smtClean="0"/>
-              <a:t>cloud service</a:t>
+              <a:rPr lang="en-US" altLang="zh-TW" dirty="0">
+                <a:latin typeface="Miriam" panose="020B0502050101010101" pitchFamily="34" charset="-79"/>
+                <a:cs typeface="Miriam" panose="020B0502050101010101" pitchFamily="34" charset="-79"/>
+              </a:rPr>
+              <a:t>code reusability?</a:t>
             </a:r>
-            <a:r>
-              <a:rPr lang="zh-TW" altLang="en-US" dirty="0" smtClean="0"/>
-              <a:t>都需要有一個對應的</a:t>
-            </a:r>
-            <a:r>
-              <a:rPr lang="en-US" altLang="zh-TW" dirty="0" smtClean="0"/>
-              <a:t>crawler</a:t>
-            </a:r>
-            <a:r>
-              <a:rPr lang="zh-TW" altLang="en-US" dirty="0"/>
-              <a:t>？</a:t>
-            </a:r>
+            <a:endParaRPr lang="en-US" altLang="zh-TW" dirty="0" smtClean="0">
+              <a:latin typeface="Miriam" panose="020B0502050101010101" pitchFamily="34" charset="-79"/>
+              <a:cs typeface="Miriam" panose="020B0502050101010101" pitchFamily="34" charset="-79"/>
+            </a:endParaRPr>
+          </a:p>
+          <a:p>
+            <a:pPr marL="285750" indent="-285750">
+              <a:buFont typeface="Wingdings" panose="05000000000000000000" pitchFamily="2" charset="2"/>
+              <a:buChar char="Ø"/>
+            </a:pPr>
+            <a:endParaRPr lang="zh-TW" altLang="en-US" dirty="0"/>
           </a:p>
         </p:txBody>
       </p:sp>
@@ -5185,44 +5240,73 @@
               <a:buChar char="Ø"/>
             </a:pPr>
             <a:r>
-              <a:rPr lang="en-US" altLang="zh-TW" dirty="0" smtClean="0"/>
-              <a:t>AWS</a:t>
+              <a:rPr lang="en-US" altLang="zh-TW" sz="2000" dirty="0" smtClean="0">
+                <a:latin typeface="Miriam" panose="020B0502050101010101" pitchFamily="34" charset="-79"/>
+                <a:cs typeface="Miriam" panose="020B0502050101010101" pitchFamily="34" charset="-79"/>
+              </a:rPr>
+              <a:t>Each crawler have similar functionality, but with different parameter, description, additional field, tags, Logger message. </a:t>
+            </a:r>
+          </a:p>
+          <a:p>
+            <a:pPr marL="285750" indent="-285750">
+              <a:buFont typeface="Wingdings" panose="05000000000000000000" pitchFamily="2" charset="2"/>
+              <a:buChar char="Ø"/>
+            </a:pPr>
+            <a:endParaRPr lang="en-US" altLang="zh-TW" sz="2000" dirty="0">
+              <a:latin typeface="Miriam" panose="020B0502050101010101" pitchFamily="34" charset="-79"/>
+              <a:cs typeface="Miriam" panose="020B0502050101010101" pitchFamily="34" charset="-79"/>
+            </a:endParaRPr>
+          </a:p>
+          <a:p>
+            <a:pPr marL="285750" indent="-285750">
+              <a:buFont typeface="Wingdings" panose="05000000000000000000" pitchFamily="2" charset="2"/>
+              <a:buChar char="Ø"/>
+            </a:pPr>
+            <a:endParaRPr lang="en-US" altLang="zh-TW" sz="2000" dirty="0" smtClean="0">
+              <a:latin typeface="Miriam" panose="020B0502050101010101" pitchFamily="34" charset="-79"/>
+              <a:cs typeface="Miriam" panose="020B0502050101010101" pitchFamily="34" charset="-79"/>
+            </a:endParaRPr>
+          </a:p>
+          <a:p>
+            <a:pPr marL="285750" indent="-285750">
+              <a:buFont typeface="Wingdings" panose="05000000000000000000" pitchFamily="2" charset="2"/>
+              <a:buChar char="Ø"/>
+            </a:pPr>
+            <a:r>
+              <a:rPr lang="en-US" altLang="zh-TW" sz="2000" dirty="0" smtClean="0">
+                <a:latin typeface="Miriam" panose="020B0502050101010101" pitchFamily="34" charset="-79"/>
+                <a:cs typeface="Miriam" panose="020B0502050101010101" pitchFamily="34" charset="-79"/>
+              </a:rPr>
+              <a:t>Take </a:t>
             </a:r>
             <a:r>
-              <a:rPr lang="zh-TW" altLang="en-US" dirty="0" smtClean="0"/>
-              <a:t>的</a:t>
+              <a:rPr lang="en-US" altLang="zh-TW" sz="2000" dirty="0" err="1" smtClean="0">
+                <a:latin typeface="Miriam" panose="020B0502050101010101" pitchFamily="34" charset="-79"/>
+                <a:cs typeface="Miriam" panose="020B0502050101010101" pitchFamily="34" charset="-79"/>
+              </a:rPr>
+              <a:t>getInstanceResources</a:t>
             </a:r>
             <a:r>
-              <a:rPr lang="en-US" altLang="zh-TW" dirty="0" smtClean="0"/>
-              <a:t>API</a:t>
+              <a:rPr lang="en-US" altLang="zh-TW" sz="2000" dirty="0" smtClean="0">
+                <a:latin typeface="Miriam" panose="020B0502050101010101" pitchFamily="34" charset="-79"/>
+                <a:cs typeface="Miriam" panose="020B0502050101010101" pitchFamily="34" charset="-79"/>
+              </a:rPr>
+              <a:t>() and </a:t>
             </a:r>
             <a:r>
-              <a:rPr lang="zh-TW" altLang="en-US" dirty="0" smtClean="0"/>
-              <a:t>要求</a:t>
+              <a:rPr lang="en-US" altLang="zh-TW" sz="2000" dirty="0" err="1" smtClean="0">
+                <a:latin typeface="Miriam" panose="020B0502050101010101" pitchFamily="34" charset="-79"/>
+                <a:cs typeface="Miriam" panose="020B0502050101010101" pitchFamily="34" charset="-79"/>
+              </a:rPr>
+              <a:t>getELBResources</a:t>
             </a:r>
             <a:r>
-              <a:rPr lang="en-US" altLang="zh-TW" dirty="0" smtClean="0"/>
-              <a:t>request</a:t>
+              <a:rPr lang="en-US" altLang="zh-TW" sz="2000" dirty="0" smtClean="0">
+                <a:latin typeface="Miriam" panose="020B0502050101010101" pitchFamily="34" charset="-79"/>
+                <a:cs typeface="Miriam" panose="020B0502050101010101" pitchFamily="34" charset="-79"/>
+              </a:rPr>
+              <a:t>() as example</a:t>
             </a:r>
-            <a:r>
-              <a:rPr lang="zh-TW" altLang="en-US" dirty="0" smtClean="0"/>
-              <a:t>的時候必須指定</a:t>
-            </a:r>
-            <a:r>
-              <a:rPr lang="en-US" altLang="zh-TW" dirty="0" smtClean="0"/>
-              <a:t>type</a:t>
-            </a:r>
-            <a:r>
-              <a:rPr lang="zh-TW" altLang="en-US" dirty="0" smtClean="0"/>
-              <a:t>，所以沒辦法做</a:t>
-            </a:r>
-            <a:r>
-              <a:rPr lang="en-US" altLang="zh-TW" dirty="0" smtClean="0"/>
-              <a:t>abstraction</a:t>
-            </a:r>
-          </a:p>
-          <a:p>
-            <a:endParaRPr lang="zh-TW" altLang="en-US" dirty="0"/>
           </a:p>
         </p:txBody>
       </p:sp>
@@ -5258,685 +5342,7 @@
     </p:spTree>
     <p:extLst>
       <p:ext uri="{BB962C8B-B14F-4D97-AF65-F5344CB8AC3E}">
-        <p14:creationId xmlns:p14="http://schemas.microsoft.com/office/powerpoint/2010/main" val="4016511809"/>
-      </p:ext>
-    </p:extLst>
-  </p:cSld>
-  <p:clrMapOvr>
-    <a:masterClrMapping/>
-  </p:clrMapOvr>
-  <p:timing>
-    <p:tnLst>
-      <p:par>
-        <p:cTn id="1" dur="indefinite" restart="never" nodeType="tmRoot"/>
-      </p:par>
-    </p:tnLst>
-  </p:timing>
-</p:sld>
-</file>
-
-<file path=ppt/slides/slide13.xml><?xml version="1.0" encoding="utf-8"?>
-<p:sld xmlns:a="http://schemas.openxmlformats.org/drawingml/2006/main" xmlns:r="http://schemas.openxmlformats.org/officeDocument/2006/relationships" xmlns:p="http://schemas.openxmlformats.org/presentationml/2006/main">
-  <p:cSld>
-    <p:spTree>
-      <p:nvGrpSpPr>
-        <p:cNvPr id="1" name=""/>
-        <p:cNvGrpSpPr/>
-        <p:nvPr/>
-      </p:nvGrpSpPr>
-      <p:grpSpPr>
-        <a:xfrm>
-          <a:off x="0" y="0"/>
-          <a:ext cx="0" cy="0"/>
-          <a:chOff x="0" y="0"/>
-          <a:chExt cx="0" cy="0"/>
-        </a:xfrm>
-      </p:grpSpPr>
-      <p:sp>
-        <p:nvSpPr>
-          <p:cNvPr id="4" name="投影片編號版面配置區 3"/>
-          <p:cNvSpPr>
-            <a:spLocks noGrp="1"/>
-          </p:cNvSpPr>
-          <p:nvPr>
-            <p:ph type="sldNum" idx="12"/>
-          </p:nvPr>
-        </p:nvSpPr>
-        <p:spPr/>
-        <p:txBody>
-          <a:bodyPr/>
-          <a:lstStyle/>
-          <a:p>
-            <a:pPr lvl="0">
-              <a:spcBef>
-                <a:spcPts val="0"/>
-              </a:spcBef>
-              <a:buNone/>
-            </a:pPr>
-            <a:fld id="{00000000-1234-1234-1234-123412341234}" type="slidenum">
-              <a:rPr lang="en" smtClean="0"/>
-              <a:t>13</a:t>
-            </a:fld>
-            <a:endParaRPr lang="en"/>
-          </a:p>
-        </p:txBody>
-      </p:sp>
-      <p:pic>
-        <p:nvPicPr>
-          <p:cNvPr id="5" name="圖片 4"/>
-          <p:cNvPicPr>
-            <a:picLocks noChangeAspect="1"/>
-          </p:cNvPicPr>
-          <p:nvPr/>
-        </p:nvPicPr>
-        <p:blipFill>
-          <a:blip r:embed="rId2">
-            <a:extLst>
-              <a:ext uri="{28A0092B-C50C-407E-A947-70E740481C1C}">
-                <a14:useLocalDpi xmlns:a14="http://schemas.microsoft.com/office/drawing/2010/main" val="0"/>
-              </a:ext>
-            </a:extLst>
-          </a:blip>
-          <a:stretch>
-            <a:fillRect/>
-          </a:stretch>
-        </p:blipFill>
-        <p:spPr>
-          <a:xfrm>
-            <a:off x="185125" y="575331"/>
-            <a:ext cx="8773749" cy="3600953"/>
-          </a:xfrm>
-          <a:prstGeom prst="rect">
-            <a:avLst/>
-          </a:prstGeom>
-        </p:spPr>
-      </p:pic>
-    </p:spTree>
-    <p:extLst>
-      <p:ext uri="{BB962C8B-B14F-4D97-AF65-F5344CB8AC3E}">
-        <p14:creationId xmlns:p14="http://schemas.microsoft.com/office/powerpoint/2010/main" val="4120312909"/>
-      </p:ext>
-    </p:extLst>
-  </p:cSld>
-  <p:clrMapOvr>
-    <a:masterClrMapping/>
-  </p:clrMapOvr>
-  <p:timing>
-    <p:tnLst>
-      <p:par>
-        <p:cTn id="1" dur="indefinite" restart="never" nodeType="tmRoot"/>
-      </p:par>
-    </p:tnLst>
-  </p:timing>
-</p:sld>
-</file>
-
-<file path=ppt/slides/slide14.xml><?xml version="1.0" encoding="utf-8"?>
-<p:sld xmlns:a="http://schemas.openxmlformats.org/drawingml/2006/main" xmlns:r="http://schemas.openxmlformats.org/officeDocument/2006/relationships" xmlns:p="http://schemas.openxmlformats.org/presentationml/2006/main">
-  <p:cSld>
-    <p:spTree>
-      <p:nvGrpSpPr>
-        <p:cNvPr id="1" name=""/>
-        <p:cNvGrpSpPr/>
-        <p:nvPr/>
-      </p:nvGrpSpPr>
-      <p:grpSpPr>
-        <a:xfrm>
-          <a:off x="0" y="0"/>
-          <a:ext cx="0" cy="0"/>
-          <a:chOff x="0" y="0"/>
-          <a:chExt cx="0" cy="0"/>
-        </a:xfrm>
-      </p:grpSpPr>
-      <p:sp>
-        <p:nvSpPr>
-          <p:cNvPr id="4" name="投影片編號版面配置區 3"/>
-          <p:cNvSpPr>
-            <a:spLocks noGrp="1"/>
-          </p:cNvSpPr>
-          <p:nvPr>
-            <p:ph type="sldNum" idx="12"/>
-          </p:nvPr>
-        </p:nvSpPr>
-        <p:spPr/>
-        <p:txBody>
-          <a:bodyPr/>
-          <a:lstStyle/>
-          <a:p>
-            <a:pPr lvl="0">
-              <a:spcBef>
-                <a:spcPts val="0"/>
-              </a:spcBef>
-              <a:buNone/>
-            </a:pPr>
-            <a:fld id="{00000000-1234-1234-1234-123412341234}" type="slidenum">
-              <a:rPr lang="en" smtClean="0"/>
-              <a:t>14</a:t>
-            </a:fld>
-            <a:endParaRPr lang="en"/>
-          </a:p>
-        </p:txBody>
-      </p:sp>
-      <p:pic>
-        <p:nvPicPr>
-          <p:cNvPr id="5" name="圖片 4"/>
-          <p:cNvPicPr>
-            <a:picLocks noChangeAspect="1"/>
-          </p:cNvPicPr>
-          <p:nvPr/>
-        </p:nvPicPr>
-        <p:blipFill>
-          <a:blip r:embed="rId2">
-            <a:extLst>
-              <a:ext uri="{28A0092B-C50C-407E-A947-70E740481C1C}">
-                <a14:useLocalDpi xmlns:a14="http://schemas.microsoft.com/office/drawing/2010/main" val="0"/>
-              </a:ext>
-            </a:extLst>
-          </a:blip>
-          <a:stretch>
-            <a:fillRect/>
-          </a:stretch>
-        </p:blipFill>
-        <p:spPr>
-          <a:xfrm>
-            <a:off x="271234" y="506186"/>
-            <a:ext cx="7853441" cy="3548301"/>
-          </a:xfrm>
-          <a:prstGeom prst="rect">
-            <a:avLst/>
-          </a:prstGeom>
-        </p:spPr>
-      </p:pic>
-    </p:spTree>
-    <p:extLst>
-      <p:ext uri="{BB962C8B-B14F-4D97-AF65-F5344CB8AC3E}">
-        <p14:creationId xmlns:p14="http://schemas.microsoft.com/office/powerpoint/2010/main" val="2279054329"/>
-      </p:ext>
-    </p:extLst>
-  </p:cSld>
-  <p:clrMapOvr>
-    <a:masterClrMapping/>
-  </p:clrMapOvr>
-  <p:timing>
-    <p:tnLst>
-      <p:par>
-        <p:cTn id="1" dur="indefinite" restart="never" nodeType="tmRoot"/>
-      </p:par>
-    </p:tnLst>
-  </p:timing>
-</p:sld>
-</file>
-
-<file path=ppt/slides/slide15.xml><?xml version="1.0" encoding="utf-8"?>
-<p:sld xmlns:a="http://schemas.openxmlformats.org/drawingml/2006/main" xmlns:r="http://schemas.openxmlformats.org/officeDocument/2006/relationships" xmlns:p="http://schemas.openxmlformats.org/presentationml/2006/main">
-  <p:cSld>
-    <p:spTree>
-      <p:nvGrpSpPr>
-        <p:cNvPr id="1" name=""/>
-        <p:cNvGrpSpPr/>
-        <p:nvPr/>
-      </p:nvGrpSpPr>
-      <p:grpSpPr>
-        <a:xfrm>
-          <a:off x="0" y="0"/>
-          <a:ext cx="0" cy="0"/>
-          <a:chOff x="0" y="0"/>
-          <a:chExt cx="0" cy="0"/>
-        </a:xfrm>
-      </p:grpSpPr>
-      <p:sp>
-        <p:nvSpPr>
-          <p:cNvPr id="2" name="標題 1"/>
-          <p:cNvSpPr>
-            <a:spLocks noGrp="1"/>
-          </p:cNvSpPr>
-          <p:nvPr>
-            <p:ph type="title"/>
-          </p:nvPr>
-        </p:nvSpPr>
-        <p:spPr/>
-        <p:txBody>
-          <a:bodyPr/>
-          <a:lstStyle/>
-          <a:p>
-            <a:r>
-              <a:rPr lang="en-US" altLang="zh-TW" dirty="0" smtClean="0"/>
-              <a:t>Answer 1</a:t>
-            </a:r>
-            <a:endParaRPr lang="zh-TW" altLang="en-US" dirty="0"/>
-          </a:p>
-        </p:txBody>
-      </p:sp>
-      <p:sp>
-        <p:nvSpPr>
-          <p:cNvPr id="3" name="文字版面配置區 2"/>
-          <p:cNvSpPr>
-            <a:spLocks noGrp="1"/>
-          </p:cNvSpPr>
-          <p:nvPr>
-            <p:ph type="body" idx="1"/>
-          </p:nvPr>
-        </p:nvSpPr>
-        <p:spPr/>
-        <p:txBody>
-          <a:bodyPr/>
-          <a:lstStyle/>
-          <a:p>
-            <a:pPr marL="285750" indent="-285750">
-              <a:buFont typeface="Wingdings" panose="05000000000000000000" pitchFamily="2" charset="2"/>
-              <a:buChar char="Ø"/>
-            </a:pPr>
-            <a:r>
-              <a:rPr lang="en-US" altLang="zh-TW" dirty="0" smtClean="0"/>
-              <a:t>AWS</a:t>
-            </a:r>
-            <a:r>
-              <a:rPr lang="zh-TW" altLang="en-US" dirty="0" smtClean="0"/>
-              <a:t>的</a:t>
-            </a:r>
-            <a:r>
-              <a:rPr lang="en-US" altLang="zh-TW" dirty="0" smtClean="0"/>
-              <a:t>API</a:t>
-            </a:r>
-            <a:r>
-              <a:rPr lang="zh-TW" altLang="en-US" dirty="0" smtClean="0"/>
-              <a:t>要求</a:t>
-            </a:r>
-            <a:r>
-              <a:rPr lang="en-US" altLang="zh-TW" dirty="0" smtClean="0"/>
-              <a:t>request</a:t>
-            </a:r>
-            <a:r>
-              <a:rPr lang="zh-TW" altLang="en-US" dirty="0" smtClean="0"/>
-              <a:t>的時候必須指定</a:t>
-            </a:r>
-            <a:r>
-              <a:rPr lang="en-US" altLang="zh-TW" dirty="0" smtClean="0"/>
-              <a:t>type</a:t>
-            </a:r>
-            <a:r>
-              <a:rPr lang="zh-TW" altLang="en-US" dirty="0" smtClean="0"/>
-              <a:t>，所以沒辦法做</a:t>
-            </a:r>
-            <a:r>
-              <a:rPr lang="en-US" altLang="zh-TW" dirty="0" smtClean="0"/>
-              <a:t>abstraction</a:t>
-            </a:r>
-          </a:p>
-          <a:p>
-            <a:pPr marL="285750" indent="-285750">
-              <a:buFont typeface="Wingdings" panose="05000000000000000000" pitchFamily="2" charset="2"/>
-              <a:buChar char="Ø"/>
-            </a:pPr>
-            <a:r>
-              <a:rPr lang="zh-TW" altLang="en-US" dirty="0" smtClean="0"/>
-              <a:t>違反</a:t>
-            </a:r>
-            <a:r>
-              <a:rPr lang="en-US" altLang="zh-TW" dirty="0" smtClean="0"/>
-              <a:t>Single Responsibility Principle</a:t>
-            </a:r>
-            <a:endParaRPr lang="zh-TW" altLang="en-US" dirty="0"/>
-          </a:p>
-        </p:txBody>
-      </p:sp>
-      <p:sp>
-        <p:nvSpPr>
-          <p:cNvPr id="4" name="投影片編號版面配置區 3"/>
-          <p:cNvSpPr>
-            <a:spLocks noGrp="1"/>
-          </p:cNvSpPr>
-          <p:nvPr>
-            <p:ph type="sldNum" idx="12"/>
-          </p:nvPr>
-        </p:nvSpPr>
-        <p:spPr/>
-        <p:txBody>
-          <a:bodyPr/>
-          <a:lstStyle/>
-          <a:p>
-            <a:pPr lvl="0">
-              <a:spcBef>
-                <a:spcPts val="0"/>
-              </a:spcBef>
-              <a:buNone/>
-            </a:pPr>
-            <a:fld id="{00000000-1234-1234-1234-123412341234}" type="slidenum">
-              <a:rPr lang="en" smtClean="0"/>
-              <a:t>15</a:t>
-            </a:fld>
-            <a:endParaRPr lang="en"/>
-          </a:p>
-        </p:txBody>
-      </p:sp>
-    </p:spTree>
-    <p:extLst>
-      <p:ext uri="{BB962C8B-B14F-4D97-AF65-F5344CB8AC3E}">
         <p14:creationId xmlns:p14="http://schemas.microsoft.com/office/powerpoint/2010/main" val="78569227"/>
-      </p:ext>
-    </p:extLst>
-  </p:cSld>
-  <p:clrMapOvr>
-    <a:masterClrMapping/>
-  </p:clrMapOvr>
-  <p:timing>
-    <p:tnLst>
-      <p:par>
-        <p:cTn id="1" dur="indefinite" restart="never" nodeType="tmRoot"/>
-      </p:par>
-    </p:tnLst>
-  </p:timing>
-</p:sld>
-</file>
-
-<file path=ppt/slides/slide16.xml><?xml version="1.0" encoding="utf-8"?>
-<p:sld xmlns:a="http://schemas.openxmlformats.org/drawingml/2006/main" xmlns:r="http://schemas.openxmlformats.org/officeDocument/2006/relationships" xmlns:p="http://schemas.openxmlformats.org/presentationml/2006/main">
-  <p:cSld>
-    <p:spTree>
-      <p:nvGrpSpPr>
-        <p:cNvPr id="1" name=""/>
-        <p:cNvGrpSpPr/>
-        <p:nvPr/>
-      </p:nvGrpSpPr>
-      <p:grpSpPr>
-        <a:xfrm>
-          <a:off x="0" y="0"/>
-          <a:ext cx="0" cy="0"/>
-          <a:chOff x="0" y="0"/>
-          <a:chExt cx="0" cy="0"/>
-        </a:xfrm>
-      </p:grpSpPr>
-      <p:sp>
-        <p:nvSpPr>
-          <p:cNvPr id="2" name="標題 1"/>
-          <p:cNvSpPr>
-            <a:spLocks noGrp="1"/>
-          </p:cNvSpPr>
-          <p:nvPr>
-            <p:ph type="title"/>
-          </p:nvPr>
-        </p:nvSpPr>
-        <p:spPr/>
-        <p:txBody>
-          <a:bodyPr/>
-          <a:lstStyle/>
-          <a:p>
-            <a:r>
-              <a:rPr lang="en-US" altLang="zh-TW" dirty="0" smtClean="0"/>
-              <a:t>Question 2</a:t>
-            </a:r>
-            <a:endParaRPr lang="zh-TW" altLang="en-US" dirty="0"/>
-          </a:p>
-        </p:txBody>
-      </p:sp>
-      <p:sp>
-        <p:nvSpPr>
-          <p:cNvPr id="3" name="文字版面配置區 2"/>
-          <p:cNvSpPr>
-            <a:spLocks noGrp="1"/>
-          </p:cNvSpPr>
-          <p:nvPr>
-            <p:ph type="body" idx="1"/>
-          </p:nvPr>
-        </p:nvSpPr>
-        <p:spPr/>
-        <p:txBody>
-          <a:bodyPr/>
-          <a:lstStyle/>
-          <a:p>
-            <a:pPr marL="285750" indent="-285750">
-              <a:buFont typeface="Wingdings" panose="05000000000000000000" pitchFamily="2" charset="2"/>
-              <a:buChar char="Ø"/>
-            </a:pPr>
-            <a:r>
-              <a:rPr lang="en-US" altLang="zh-TW" dirty="0" smtClean="0"/>
-              <a:t>Conformity monkey</a:t>
-            </a:r>
-            <a:r>
-              <a:rPr lang="zh-TW" altLang="en-US" dirty="0" smtClean="0"/>
-              <a:t>也是使用</a:t>
-            </a:r>
-            <a:r>
-              <a:rPr lang="en-US" altLang="zh-TW" dirty="0" smtClean="0"/>
-              <a:t>AWS-based crawler</a:t>
-            </a:r>
-            <a:r>
-              <a:rPr lang="zh-TW" altLang="en-US" dirty="0" smtClean="0"/>
-              <a:t>，為什麼</a:t>
-            </a:r>
-            <a:r>
-              <a:rPr lang="en-US" altLang="zh-TW" dirty="0" smtClean="0"/>
-              <a:t>Conformity monkey</a:t>
-            </a:r>
-            <a:r>
-              <a:rPr lang="zh-TW" altLang="en-US" dirty="0" smtClean="0"/>
-              <a:t>和</a:t>
-            </a:r>
-            <a:r>
-              <a:rPr lang="en-US" altLang="zh-TW" dirty="0" smtClean="0"/>
-              <a:t>Janitor monkey</a:t>
-            </a:r>
-            <a:r>
-              <a:rPr lang="zh-TW" altLang="en-US" dirty="0" smtClean="0"/>
-              <a:t>不共用</a:t>
-            </a:r>
-            <a:r>
-              <a:rPr lang="en-US" altLang="zh-TW" dirty="0" smtClean="0"/>
-              <a:t>AWS-based crawler?</a:t>
-            </a:r>
-          </a:p>
-        </p:txBody>
-      </p:sp>
-      <p:sp>
-        <p:nvSpPr>
-          <p:cNvPr id="4" name="投影片編號版面配置區 3"/>
-          <p:cNvSpPr>
-            <a:spLocks noGrp="1"/>
-          </p:cNvSpPr>
-          <p:nvPr>
-            <p:ph type="sldNum" idx="12"/>
-          </p:nvPr>
-        </p:nvSpPr>
-        <p:spPr/>
-        <p:txBody>
-          <a:bodyPr/>
-          <a:lstStyle/>
-          <a:p>
-            <a:pPr lvl="0">
-              <a:spcBef>
-                <a:spcPts val="0"/>
-              </a:spcBef>
-              <a:buNone/>
-            </a:pPr>
-            <a:fld id="{00000000-1234-1234-1234-123412341234}" type="slidenum">
-              <a:rPr lang="en" smtClean="0"/>
-              <a:t>16</a:t>
-            </a:fld>
-            <a:endParaRPr lang="en"/>
-          </a:p>
-        </p:txBody>
-      </p:sp>
-    </p:spTree>
-    <p:extLst>
-      <p:ext uri="{BB962C8B-B14F-4D97-AF65-F5344CB8AC3E}">
-        <p14:creationId xmlns:p14="http://schemas.microsoft.com/office/powerpoint/2010/main" val="4223851756"/>
-      </p:ext>
-    </p:extLst>
-  </p:cSld>
-  <p:clrMapOvr>
-    <a:masterClrMapping/>
-  </p:clrMapOvr>
-  <p:timing>
-    <p:tnLst>
-      <p:par>
-        <p:cTn id="1" dur="indefinite" restart="never" nodeType="tmRoot"/>
-      </p:par>
-    </p:tnLst>
-  </p:timing>
-</p:sld>
-</file>
-
-<file path=ppt/slides/slide17.xml><?xml version="1.0" encoding="utf-8"?>
-<p:sld xmlns:a="http://schemas.openxmlformats.org/drawingml/2006/main" xmlns:r="http://schemas.openxmlformats.org/officeDocument/2006/relationships" xmlns:p="http://schemas.openxmlformats.org/presentationml/2006/main">
-  <p:cSld>
-    <p:spTree>
-      <p:nvGrpSpPr>
-        <p:cNvPr id="1" name=""/>
-        <p:cNvGrpSpPr/>
-        <p:nvPr/>
-      </p:nvGrpSpPr>
-      <p:grpSpPr>
-        <a:xfrm>
-          <a:off x="0" y="0"/>
-          <a:ext cx="0" cy="0"/>
-          <a:chOff x="0" y="0"/>
-          <a:chExt cx="0" cy="0"/>
-        </a:xfrm>
-      </p:grpSpPr>
-      <p:sp>
-        <p:nvSpPr>
-          <p:cNvPr id="2" name="標題 1"/>
-          <p:cNvSpPr>
-            <a:spLocks noGrp="1"/>
-          </p:cNvSpPr>
-          <p:nvPr>
-            <p:ph type="title"/>
-          </p:nvPr>
-        </p:nvSpPr>
-        <p:spPr/>
-        <p:txBody>
-          <a:bodyPr/>
-          <a:lstStyle/>
-          <a:p>
-            <a:r>
-              <a:rPr lang="en-US" altLang="zh-TW" dirty="0" smtClean="0"/>
-              <a:t>Answer 2</a:t>
-            </a:r>
-            <a:endParaRPr lang="zh-TW" altLang="en-US" dirty="0"/>
-          </a:p>
-        </p:txBody>
-      </p:sp>
-      <p:sp>
-        <p:nvSpPr>
-          <p:cNvPr id="3" name="文字版面配置區 2"/>
-          <p:cNvSpPr>
-            <a:spLocks noGrp="1"/>
-          </p:cNvSpPr>
-          <p:nvPr>
-            <p:ph type="body" idx="1"/>
-          </p:nvPr>
-        </p:nvSpPr>
-        <p:spPr/>
-        <p:txBody>
-          <a:bodyPr/>
-          <a:lstStyle/>
-          <a:p>
-            <a:pPr marL="285750" indent="-285750">
-              <a:buFont typeface="Wingdings" panose="05000000000000000000" pitchFamily="2" charset="2"/>
-              <a:buChar char="Ø"/>
-            </a:pPr>
-            <a:r>
-              <a:rPr lang="en-US" altLang="zh-TW" dirty="0" smtClean="0"/>
-              <a:t>Conformity monkey</a:t>
-            </a:r>
-            <a:r>
-              <a:rPr lang="zh-TW" altLang="en-US" dirty="0" smtClean="0"/>
-              <a:t>是以</a:t>
-            </a:r>
-            <a:r>
-              <a:rPr lang="en-US" altLang="zh-TW" dirty="0" smtClean="0"/>
-              <a:t>Cluster</a:t>
-            </a:r>
-            <a:r>
-              <a:rPr lang="zh-TW" altLang="en-US" dirty="0" smtClean="0"/>
-              <a:t>做為基本工作單位，</a:t>
-            </a:r>
-            <a:endParaRPr lang="en-US" altLang="zh-TW" dirty="0" smtClean="0"/>
-          </a:p>
-          <a:p>
-            <a:r>
-              <a:rPr lang="en-US" altLang="zh-TW" dirty="0"/>
-              <a:t> </a:t>
-            </a:r>
-            <a:r>
-              <a:rPr lang="en-US" altLang="zh-TW" dirty="0" smtClean="0"/>
-              <a:t>    </a:t>
-            </a:r>
-            <a:r>
-              <a:rPr lang="zh-TW" altLang="en-US" dirty="0" smtClean="0"/>
-              <a:t>而</a:t>
-            </a:r>
-            <a:r>
-              <a:rPr lang="en-US" altLang="zh-TW" dirty="0" smtClean="0"/>
-              <a:t>Janitor monkey</a:t>
-            </a:r>
-            <a:r>
-              <a:rPr lang="zh-TW" altLang="en-US" dirty="0" smtClean="0"/>
-              <a:t>是以</a:t>
-            </a:r>
-            <a:r>
-              <a:rPr lang="en-US" altLang="zh-TW" dirty="0" smtClean="0"/>
-              <a:t>Resource</a:t>
-            </a:r>
-            <a:r>
-              <a:rPr lang="zh-TW" altLang="en-US" dirty="0" smtClean="0"/>
-              <a:t>做為基本工作單位。</a:t>
-            </a:r>
-            <a:endParaRPr lang="en-US" altLang="zh-TW" dirty="0" smtClean="0"/>
-          </a:p>
-          <a:p>
-            <a:endParaRPr lang="en-US" altLang="zh-TW" dirty="0"/>
-          </a:p>
-          <a:p>
-            <a:pPr marL="285750" indent="-285750">
-              <a:buFont typeface="Wingdings" panose="05000000000000000000" pitchFamily="2" charset="2"/>
-              <a:buChar char="Ø"/>
-            </a:pPr>
-            <a:r>
-              <a:rPr lang="zh-TW" altLang="en-US" dirty="0" smtClean="0"/>
-              <a:t>違反</a:t>
-            </a:r>
-            <a:r>
-              <a:rPr lang="en-US" altLang="zh-TW" dirty="0" smtClean="0"/>
-              <a:t>Single Responsibility Principle</a:t>
-            </a:r>
-            <a:endParaRPr lang="zh-TW" altLang="en-US" dirty="0"/>
-          </a:p>
-        </p:txBody>
-      </p:sp>
-      <p:sp>
-        <p:nvSpPr>
-          <p:cNvPr id="4" name="投影片編號版面配置區 3"/>
-          <p:cNvSpPr>
-            <a:spLocks noGrp="1"/>
-          </p:cNvSpPr>
-          <p:nvPr>
-            <p:ph type="sldNum" idx="12"/>
-          </p:nvPr>
-        </p:nvSpPr>
-        <p:spPr/>
-        <p:txBody>
-          <a:bodyPr/>
-          <a:lstStyle/>
-          <a:p>
-            <a:pPr lvl="0">
-              <a:spcBef>
-                <a:spcPts val="0"/>
-              </a:spcBef>
-              <a:buNone/>
-            </a:pPr>
-            <a:fld id="{00000000-1234-1234-1234-123412341234}" type="slidenum">
-              <a:rPr lang="en" smtClean="0"/>
-              <a:t>17</a:t>
-            </a:fld>
-            <a:endParaRPr lang="en"/>
-          </a:p>
-        </p:txBody>
-      </p:sp>
-    </p:spTree>
-    <p:extLst>
-      <p:ext uri="{BB962C8B-B14F-4D97-AF65-F5344CB8AC3E}">
-        <p14:creationId xmlns:p14="http://schemas.microsoft.com/office/powerpoint/2010/main" val="3053768145"/>
       </p:ext>
     </p:extLst>
   </p:cSld>
@@ -6025,7 +5431,560 @@
 </p:sld>
 </file>
 
-<file path=ppt/slides/slide18.xml><?xml version="1.0" encoding="utf-8"?>
+<file path=ppt/slides/slide13.xml><?xml version="1.0" encoding="utf-8"?>
+<p:sld xmlns:a="http://schemas.openxmlformats.org/drawingml/2006/main" xmlns:r="http://schemas.openxmlformats.org/officeDocument/2006/relationships" xmlns:p="http://schemas.openxmlformats.org/presentationml/2006/main">
+  <p:cSld>
+    <p:spTree>
+      <p:nvGrpSpPr>
+        <p:cNvPr id="1" name=""/>
+        <p:cNvGrpSpPr/>
+        <p:nvPr/>
+      </p:nvGrpSpPr>
+      <p:grpSpPr>
+        <a:xfrm>
+          <a:off x="0" y="0"/>
+          <a:ext cx="0" cy="0"/>
+          <a:chOff x="0" y="0"/>
+          <a:chExt cx="0" cy="0"/>
+        </a:xfrm>
+      </p:grpSpPr>
+      <p:sp>
+        <p:nvSpPr>
+          <p:cNvPr id="2" name="標題 1"/>
+          <p:cNvSpPr>
+            <a:spLocks noGrp="1"/>
+          </p:cNvSpPr>
+          <p:nvPr>
+            <p:ph type="title"/>
+          </p:nvPr>
+        </p:nvSpPr>
+        <p:spPr/>
+        <p:txBody>
+          <a:bodyPr/>
+          <a:lstStyle/>
+          <a:p>
+            <a:endParaRPr lang="zh-TW" altLang="en-US"/>
+          </a:p>
+        </p:txBody>
+      </p:sp>
+      <p:sp>
+        <p:nvSpPr>
+          <p:cNvPr id="3" name="文字版面配置區 2"/>
+          <p:cNvSpPr>
+            <a:spLocks noGrp="1"/>
+          </p:cNvSpPr>
+          <p:nvPr>
+            <p:ph type="body" idx="1"/>
+          </p:nvPr>
+        </p:nvSpPr>
+        <p:spPr/>
+        <p:txBody>
+          <a:bodyPr/>
+          <a:lstStyle/>
+          <a:p>
+            <a:endParaRPr lang="zh-TW" altLang="en-US"/>
+          </a:p>
+        </p:txBody>
+      </p:sp>
+      <p:sp>
+        <p:nvSpPr>
+          <p:cNvPr id="4" name="投影片編號版面配置區 3"/>
+          <p:cNvSpPr>
+            <a:spLocks noGrp="1"/>
+          </p:cNvSpPr>
+          <p:nvPr>
+            <p:ph type="sldNum" idx="12"/>
+          </p:nvPr>
+        </p:nvSpPr>
+        <p:spPr/>
+        <p:txBody>
+          <a:bodyPr/>
+          <a:lstStyle/>
+          <a:p>
+            <a:pPr lvl="0">
+              <a:spcBef>
+                <a:spcPts val="0"/>
+              </a:spcBef>
+              <a:buNone/>
+            </a:pPr>
+            <a:fld id="{00000000-1234-1234-1234-123412341234}" type="slidenum">
+              <a:rPr lang="en" smtClean="0"/>
+              <a:t>13</a:t>
+            </a:fld>
+            <a:endParaRPr lang="en"/>
+          </a:p>
+        </p:txBody>
+      </p:sp>
+      <p:pic>
+        <p:nvPicPr>
+          <p:cNvPr id="5" name="圖片 4"/>
+          <p:cNvPicPr>
+            <a:picLocks noChangeAspect="1"/>
+          </p:cNvPicPr>
+          <p:nvPr/>
+        </p:nvPicPr>
+        <p:blipFill>
+          <a:blip r:embed="rId2">
+            <a:extLst>
+              <a:ext uri="{28A0092B-C50C-407E-A947-70E740481C1C}">
+                <a14:useLocalDpi xmlns:a14="http://schemas.microsoft.com/office/drawing/2010/main" val="0"/>
+              </a:ext>
+            </a:extLst>
+          </a:blip>
+          <a:stretch>
+            <a:fillRect/>
+          </a:stretch>
+        </p:blipFill>
+        <p:spPr>
+          <a:xfrm>
+            <a:off x="155836" y="291465"/>
+            <a:ext cx="9144000" cy="4277560"/>
+          </a:xfrm>
+          <a:prstGeom prst="rect">
+            <a:avLst/>
+          </a:prstGeom>
+        </p:spPr>
+      </p:pic>
+    </p:spTree>
+    <p:extLst>
+      <p:ext uri="{BB962C8B-B14F-4D97-AF65-F5344CB8AC3E}">
+        <p14:creationId xmlns:p14="http://schemas.microsoft.com/office/powerpoint/2010/main" val="3200307335"/>
+      </p:ext>
+    </p:extLst>
+  </p:cSld>
+  <p:clrMapOvr>
+    <a:masterClrMapping/>
+  </p:clrMapOvr>
+  <p:timing>
+    <p:tnLst>
+      <p:par>
+        <p:cTn id="1" dur="indefinite" restart="never" nodeType="tmRoot"/>
+      </p:par>
+    </p:tnLst>
+  </p:timing>
+</p:sld>
+</file>
+
+<file path=ppt/slides/slide14.xml><?xml version="1.0" encoding="utf-8"?>
+<p:sld xmlns:a="http://schemas.openxmlformats.org/drawingml/2006/main" xmlns:r="http://schemas.openxmlformats.org/officeDocument/2006/relationships" xmlns:p="http://schemas.openxmlformats.org/presentationml/2006/main">
+  <p:cSld>
+    <p:spTree>
+      <p:nvGrpSpPr>
+        <p:cNvPr id="1" name=""/>
+        <p:cNvGrpSpPr/>
+        <p:nvPr/>
+      </p:nvGrpSpPr>
+      <p:grpSpPr>
+        <a:xfrm>
+          <a:off x="0" y="0"/>
+          <a:ext cx="0" cy="0"/>
+          <a:chOff x="0" y="0"/>
+          <a:chExt cx="0" cy="0"/>
+        </a:xfrm>
+      </p:grpSpPr>
+      <p:sp>
+        <p:nvSpPr>
+          <p:cNvPr id="2" name="標題 1"/>
+          <p:cNvSpPr>
+            <a:spLocks noGrp="1"/>
+          </p:cNvSpPr>
+          <p:nvPr>
+            <p:ph type="title"/>
+          </p:nvPr>
+        </p:nvSpPr>
+        <p:spPr/>
+        <p:txBody>
+          <a:bodyPr/>
+          <a:lstStyle/>
+          <a:p>
+            <a:endParaRPr lang="zh-TW" altLang="en-US"/>
+          </a:p>
+        </p:txBody>
+      </p:sp>
+      <p:sp>
+        <p:nvSpPr>
+          <p:cNvPr id="3" name="文字版面配置區 2"/>
+          <p:cNvSpPr>
+            <a:spLocks noGrp="1"/>
+          </p:cNvSpPr>
+          <p:nvPr>
+            <p:ph type="body" idx="1"/>
+          </p:nvPr>
+        </p:nvSpPr>
+        <p:spPr/>
+        <p:txBody>
+          <a:bodyPr/>
+          <a:lstStyle/>
+          <a:p>
+            <a:endParaRPr lang="zh-TW" altLang="en-US"/>
+          </a:p>
+        </p:txBody>
+      </p:sp>
+      <p:sp>
+        <p:nvSpPr>
+          <p:cNvPr id="4" name="投影片編號版面配置區 3"/>
+          <p:cNvSpPr>
+            <a:spLocks noGrp="1"/>
+          </p:cNvSpPr>
+          <p:nvPr>
+            <p:ph type="sldNum" idx="12"/>
+          </p:nvPr>
+        </p:nvSpPr>
+        <p:spPr/>
+        <p:txBody>
+          <a:bodyPr/>
+          <a:lstStyle/>
+          <a:p>
+            <a:pPr lvl="0">
+              <a:spcBef>
+                <a:spcPts val="0"/>
+              </a:spcBef>
+              <a:buNone/>
+            </a:pPr>
+            <a:fld id="{00000000-1234-1234-1234-123412341234}" type="slidenum">
+              <a:rPr lang="en" smtClean="0"/>
+              <a:t>14</a:t>
+            </a:fld>
+            <a:endParaRPr lang="en"/>
+          </a:p>
+        </p:txBody>
+      </p:sp>
+      <p:pic>
+        <p:nvPicPr>
+          <p:cNvPr id="5" name="圖片 4"/>
+          <p:cNvPicPr>
+            <a:picLocks noChangeAspect="1"/>
+          </p:cNvPicPr>
+          <p:nvPr/>
+        </p:nvPicPr>
+        <p:blipFill>
+          <a:blip r:embed="rId2">
+            <a:extLst>
+              <a:ext uri="{28A0092B-C50C-407E-A947-70E740481C1C}">
+                <a14:useLocalDpi xmlns:a14="http://schemas.microsoft.com/office/drawing/2010/main" val="0"/>
+              </a:ext>
+            </a:extLst>
+          </a:blip>
+          <a:stretch>
+            <a:fillRect/>
+          </a:stretch>
+        </p:blipFill>
+        <p:spPr>
+          <a:xfrm>
+            <a:off x="160037" y="171115"/>
+            <a:ext cx="8449854" cy="4801270"/>
+          </a:xfrm>
+          <a:prstGeom prst="rect">
+            <a:avLst/>
+          </a:prstGeom>
+        </p:spPr>
+      </p:pic>
+    </p:spTree>
+    <p:extLst>
+      <p:ext uri="{BB962C8B-B14F-4D97-AF65-F5344CB8AC3E}">
+        <p14:creationId xmlns:p14="http://schemas.microsoft.com/office/powerpoint/2010/main" val="4173055440"/>
+      </p:ext>
+    </p:extLst>
+  </p:cSld>
+  <p:clrMapOvr>
+    <a:masterClrMapping/>
+  </p:clrMapOvr>
+  <p:timing>
+    <p:tnLst>
+      <p:par>
+        <p:cTn id="1" dur="indefinite" restart="never" nodeType="tmRoot"/>
+      </p:par>
+    </p:tnLst>
+  </p:timing>
+</p:sld>
+</file>
+
+<file path=ppt/slides/slide15.xml><?xml version="1.0" encoding="utf-8"?>
+<p:sld xmlns:a="http://schemas.openxmlformats.org/drawingml/2006/main" xmlns:r="http://schemas.openxmlformats.org/officeDocument/2006/relationships" xmlns:p="http://schemas.openxmlformats.org/presentationml/2006/main">
+  <p:cSld>
+    <p:spTree>
+      <p:nvGrpSpPr>
+        <p:cNvPr id="1" name=""/>
+        <p:cNvGrpSpPr/>
+        <p:nvPr/>
+      </p:nvGrpSpPr>
+      <p:grpSpPr>
+        <a:xfrm>
+          <a:off x="0" y="0"/>
+          <a:ext cx="0" cy="0"/>
+          <a:chOff x="0" y="0"/>
+          <a:chExt cx="0" cy="0"/>
+        </a:xfrm>
+      </p:grpSpPr>
+      <p:sp>
+        <p:nvSpPr>
+          <p:cNvPr id="2" name="標題 1"/>
+          <p:cNvSpPr>
+            <a:spLocks noGrp="1"/>
+          </p:cNvSpPr>
+          <p:nvPr>
+            <p:ph type="title"/>
+          </p:nvPr>
+        </p:nvSpPr>
+        <p:spPr/>
+        <p:txBody>
+          <a:bodyPr/>
+          <a:lstStyle/>
+          <a:p>
+            <a:r>
+              <a:rPr lang="en-US" altLang="zh-TW" dirty="0" smtClean="0">
+                <a:latin typeface="Miriam" panose="020B0502050101010101" pitchFamily="34" charset="-79"/>
+                <a:cs typeface="Miriam" panose="020B0502050101010101" pitchFamily="34" charset="-79"/>
+              </a:rPr>
+              <a:t>Question 2</a:t>
+            </a:r>
+            <a:endParaRPr lang="zh-TW" altLang="en-US" dirty="0">
+              <a:latin typeface="Miriam" panose="020B0502050101010101" pitchFamily="34" charset="-79"/>
+              <a:cs typeface="Miriam" panose="020B0502050101010101" pitchFamily="34" charset="-79"/>
+            </a:endParaRPr>
+          </a:p>
+        </p:txBody>
+      </p:sp>
+      <p:sp>
+        <p:nvSpPr>
+          <p:cNvPr id="3" name="文字版面配置區 2"/>
+          <p:cNvSpPr>
+            <a:spLocks noGrp="1"/>
+          </p:cNvSpPr>
+          <p:nvPr>
+            <p:ph type="body" idx="1"/>
+          </p:nvPr>
+        </p:nvSpPr>
+        <p:spPr/>
+        <p:txBody>
+          <a:bodyPr/>
+          <a:lstStyle/>
+          <a:p>
+            <a:pPr marL="285750" indent="-285750">
+              <a:buFont typeface="Wingdings" panose="05000000000000000000" pitchFamily="2" charset="2"/>
+              <a:buChar char="Ø"/>
+            </a:pPr>
+            <a:r>
+              <a:rPr lang="en-US" altLang="zh-TW" sz="2200" dirty="0" smtClean="0">
+                <a:latin typeface="Miriam" panose="020B0502050101010101" pitchFamily="34" charset="-79"/>
+                <a:cs typeface="Miriam" panose="020B0502050101010101" pitchFamily="34" charset="-79"/>
+              </a:rPr>
+              <a:t>Conformity monkey and Janitor monkey both use AWS-based crawler, is it possible to share common crawler?</a:t>
+            </a:r>
+          </a:p>
+        </p:txBody>
+      </p:sp>
+      <p:sp>
+        <p:nvSpPr>
+          <p:cNvPr id="4" name="投影片編號版面配置區 3"/>
+          <p:cNvSpPr>
+            <a:spLocks noGrp="1"/>
+          </p:cNvSpPr>
+          <p:nvPr>
+            <p:ph type="sldNum" idx="12"/>
+          </p:nvPr>
+        </p:nvSpPr>
+        <p:spPr/>
+        <p:txBody>
+          <a:bodyPr/>
+          <a:lstStyle/>
+          <a:p>
+            <a:pPr lvl="0">
+              <a:spcBef>
+                <a:spcPts val="0"/>
+              </a:spcBef>
+              <a:buNone/>
+            </a:pPr>
+            <a:fld id="{00000000-1234-1234-1234-123412341234}" type="slidenum">
+              <a:rPr lang="en" smtClean="0"/>
+              <a:t>15</a:t>
+            </a:fld>
+            <a:endParaRPr lang="en"/>
+          </a:p>
+        </p:txBody>
+      </p:sp>
+    </p:spTree>
+    <p:extLst>
+      <p:ext uri="{BB962C8B-B14F-4D97-AF65-F5344CB8AC3E}">
+        <p14:creationId xmlns:p14="http://schemas.microsoft.com/office/powerpoint/2010/main" val="4223851756"/>
+      </p:ext>
+    </p:extLst>
+  </p:cSld>
+  <p:clrMapOvr>
+    <a:masterClrMapping/>
+  </p:clrMapOvr>
+  <p:timing>
+    <p:tnLst>
+      <p:par>
+        <p:cTn id="1" dur="indefinite" restart="never" nodeType="tmRoot"/>
+      </p:par>
+    </p:tnLst>
+  </p:timing>
+</p:sld>
+</file>
+
+<file path=ppt/slides/slide16.xml><?xml version="1.0" encoding="utf-8"?>
+<p:sld xmlns:a="http://schemas.openxmlformats.org/drawingml/2006/main" xmlns:r="http://schemas.openxmlformats.org/officeDocument/2006/relationships" xmlns:p="http://schemas.openxmlformats.org/presentationml/2006/main">
+  <p:cSld>
+    <p:spTree>
+      <p:nvGrpSpPr>
+        <p:cNvPr id="1" name=""/>
+        <p:cNvGrpSpPr/>
+        <p:nvPr/>
+      </p:nvGrpSpPr>
+      <p:grpSpPr>
+        <a:xfrm>
+          <a:off x="0" y="0"/>
+          <a:ext cx="0" cy="0"/>
+          <a:chOff x="0" y="0"/>
+          <a:chExt cx="0" cy="0"/>
+        </a:xfrm>
+      </p:grpSpPr>
+      <p:sp>
+        <p:nvSpPr>
+          <p:cNvPr id="2" name="標題 1"/>
+          <p:cNvSpPr>
+            <a:spLocks noGrp="1"/>
+          </p:cNvSpPr>
+          <p:nvPr>
+            <p:ph type="title"/>
+          </p:nvPr>
+        </p:nvSpPr>
+        <p:spPr/>
+        <p:txBody>
+          <a:bodyPr/>
+          <a:lstStyle/>
+          <a:p>
+            <a:r>
+              <a:rPr lang="en-US" altLang="zh-TW" dirty="0" smtClean="0">
+                <a:latin typeface="Miriam" panose="020B0502050101010101" pitchFamily="34" charset="-79"/>
+                <a:cs typeface="Miriam" panose="020B0502050101010101" pitchFamily="34" charset="-79"/>
+              </a:rPr>
+              <a:t>Answer 2</a:t>
+            </a:r>
+            <a:endParaRPr lang="zh-TW" altLang="en-US" dirty="0">
+              <a:latin typeface="Miriam" panose="020B0502050101010101" pitchFamily="34" charset="-79"/>
+              <a:cs typeface="Miriam" panose="020B0502050101010101" pitchFamily="34" charset="-79"/>
+            </a:endParaRPr>
+          </a:p>
+        </p:txBody>
+      </p:sp>
+      <p:sp>
+        <p:nvSpPr>
+          <p:cNvPr id="3" name="文字版面配置區 2"/>
+          <p:cNvSpPr>
+            <a:spLocks noGrp="1"/>
+          </p:cNvSpPr>
+          <p:nvPr>
+            <p:ph type="body" idx="1"/>
+          </p:nvPr>
+        </p:nvSpPr>
+        <p:spPr/>
+        <p:txBody>
+          <a:bodyPr/>
+          <a:lstStyle/>
+          <a:p>
+            <a:pPr marL="285750" indent="-285750">
+              <a:buFont typeface="Wingdings" panose="05000000000000000000" pitchFamily="2" charset="2"/>
+              <a:buChar char="Ø"/>
+            </a:pPr>
+            <a:r>
+              <a:rPr lang="en-US" altLang="zh-TW" dirty="0" smtClean="0">
+                <a:latin typeface="Miriam" panose="020B0502050101010101" pitchFamily="34" charset="-79"/>
+                <a:cs typeface="Miriam" panose="020B0502050101010101" pitchFamily="34" charset="-79"/>
+              </a:rPr>
+              <a:t>Conformity monkey use Cluster as a basic unit, however Janitor monkey use Resource as a basic unit.</a:t>
+            </a:r>
+          </a:p>
+          <a:p>
+            <a:endParaRPr lang="en-US" altLang="zh-TW" dirty="0" smtClean="0">
+              <a:latin typeface="Miriam" panose="020B0502050101010101" pitchFamily="34" charset="-79"/>
+              <a:cs typeface="Miriam" panose="020B0502050101010101" pitchFamily="34" charset="-79"/>
+            </a:endParaRPr>
+          </a:p>
+          <a:p>
+            <a:pPr marL="285750" indent="-285750">
+              <a:buFont typeface="Wingdings" panose="05000000000000000000" pitchFamily="2" charset="2"/>
+              <a:buChar char="Ø"/>
+            </a:pPr>
+            <a:r>
+              <a:rPr lang="en-US" altLang="zh-TW" dirty="0" smtClean="0">
+                <a:latin typeface="Miriam" panose="020B0502050101010101" pitchFamily="34" charset="-79"/>
+                <a:cs typeface="Miriam" panose="020B0502050101010101" pitchFamily="34" charset="-79"/>
+              </a:rPr>
+              <a:t>Both crawlers have similar functionality, but </a:t>
+            </a:r>
+            <a:r>
+              <a:rPr lang="en-US" altLang="zh-TW" smtClean="0">
+                <a:latin typeface="Miriam" panose="020B0502050101010101" pitchFamily="34" charset="-79"/>
+                <a:cs typeface="Miriam" panose="020B0502050101010101" pitchFamily="34" charset="-79"/>
+              </a:rPr>
+              <a:t>different return </a:t>
+            </a:r>
+            <a:r>
+              <a:rPr lang="en-US" altLang="zh-TW" dirty="0" smtClean="0">
+                <a:latin typeface="Miriam" panose="020B0502050101010101" pitchFamily="34" charset="-79"/>
+                <a:cs typeface="Miriam" panose="020B0502050101010101" pitchFamily="34" charset="-79"/>
+              </a:rPr>
+              <a:t>datatype, tag, description, Logger message …</a:t>
+            </a:r>
+            <a:endParaRPr lang="zh-TW" altLang="en-US" dirty="0">
+              <a:latin typeface="Miriam" panose="020B0502050101010101" pitchFamily="34" charset="-79"/>
+              <a:cs typeface="Miriam" panose="020B0502050101010101" pitchFamily="34" charset="-79"/>
+            </a:endParaRPr>
+          </a:p>
+        </p:txBody>
+      </p:sp>
+      <p:sp>
+        <p:nvSpPr>
+          <p:cNvPr id="4" name="投影片編號版面配置區 3"/>
+          <p:cNvSpPr>
+            <a:spLocks noGrp="1"/>
+          </p:cNvSpPr>
+          <p:nvPr>
+            <p:ph type="sldNum" idx="12"/>
+          </p:nvPr>
+        </p:nvSpPr>
+        <p:spPr/>
+        <p:txBody>
+          <a:bodyPr/>
+          <a:lstStyle/>
+          <a:p>
+            <a:pPr lvl="0">
+              <a:spcBef>
+                <a:spcPts val="0"/>
+              </a:spcBef>
+              <a:buNone/>
+            </a:pPr>
+            <a:fld id="{00000000-1234-1234-1234-123412341234}" type="slidenum">
+              <a:rPr lang="en" smtClean="0"/>
+              <a:t>16</a:t>
+            </a:fld>
+            <a:endParaRPr lang="en"/>
+          </a:p>
+        </p:txBody>
+      </p:sp>
+    </p:spTree>
+    <p:extLst>
+      <p:ext uri="{BB962C8B-B14F-4D97-AF65-F5344CB8AC3E}">
+        <p14:creationId xmlns:p14="http://schemas.microsoft.com/office/powerpoint/2010/main" val="3053768145"/>
+      </p:ext>
+    </p:extLst>
+  </p:cSld>
+  <p:clrMapOvr>
+    <a:masterClrMapping/>
+  </p:clrMapOvr>
+  <p:timing>
+    <p:tnLst>
+      <p:par>
+        <p:cTn id="1" dur="indefinite" restart="never" nodeType="tmRoot"/>
+      </p:par>
+    </p:tnLst>
+  </p:timing>
+</p:sld>
+</file>
+
+<file path=ppt/slides/slide17.xml><?xml version="1.0" encoding="utf-8"?>
 <p:sld xmlns:a="http://schemas.openxmlformats.org/drawingml/2006/main" xmlns:r="http://schemas.openxmlformats.org/officeDocument/2006/relationships" xmlns:p="http://schemas.openxmlformats.org/presentationml/2006/main">
   <p:cSld>
     <p:spTree>
@@ -6113,7 +6072,7 @@
             </a:pPr>
             <a:fld id="{00000000-1234-1234-1234-123412341234}" type="slidenum">
               <a:rPr lang="en" smtClean="0"/>
-              <a:t>18</a:t>
+              <a:t>17</a:t>
             </a:fld>
             <a:endParaRPr lang="en"/>
           </a:p>
@@ -6123,6 +6082,150 @@
     <p:extLst>
       <p:ext uri="{BB962C8B-B14F-4D97-AF65-F5344CB8AC3E}">
         <p14:creationId xmlns:p14="http://schemas.microsoft.com/office/powerpoint/2010/main" val="1031971124"/>
+      </p:ext>
+    </p:extLst>
+  </p:cSld>
+  <p:clrMapOvr>
+    <a:masterClrMapping/>
+  </p:clrMapOvr>
+  <p:timing>
+    <p:tnLst>
+      <p:par>
+        <p:cTn id="1" dur="indefinite" restart="never" nodeType="tmRoot"/>
+      </p:par>
+    </p:tnLst>
+  </p:timing>
+</p:sld>
+</file>
+
+<file path=ppt/slides/slide18.xml><?xml version="1.0" encoding="utf-8"?>
+<p:sld xmlns:a="http://schemas.openxmlformats.org/drawingml/2006/main" xmlns:r="http://schemas.openxmlformats.org/officeDocument/2006/relationships" xmlns:p="http://schemas.openxmlformats.org/presentationml/2006/main">
+  <p:cSld>
+    <p:spTree>
+      <p:nvGrpSpPr>
+        <p:cNvPr id="1" name=""/>
+        <p:cNvGrpSpPr/>
+        <p:nvPr/>
+      </p:nvGrpSpPr>
+      <p:grpSpPr>
+        <a:xfrm>
+          <a:off x="0" y="0"/>
+          <a:ext cx="0" cy="0"/>
+          <a:chOff x="0" y="0"/>
+          <a:chExt cx="0" cy="0"/>
+        </a:xfrm>
+      </p:grpSpPr>
+      <p:sp>
+        <p:nvSpPr>
+          <p:cNvPr id="2" name="標題 1"/>
+          <p:cNvSpPr>
+            <a:spLocks noGrp="1"/>
+          </p:cNvSpPr>
+          <p:nvPr>
+            <p:ph type="title"/>
+          </p:nvPr>
+        </p:nvSpPr>
+        <p:spPr/>
+        <p:txBody>
+          <a:bodyPr/>
+          <a:lstStyle/>
+          <a:p>
+            <a:r>
+              <a:rPr lang="en-US" altLang="zh-TW" dirty="0" smtClean="0">
+                <a:latin typeface="Miriam" panose="020B0502050101010101" pitchFamily="34" charset="-79"/>
+                <a:cs typeface="Miriam" panose="020B0502050101010101" pitchFamily="34" charset="-79"/>
+              </a:rPr>
+              <a:t>TODO comment</a:t>
+            </a:r>
+            <a:endParaRPr lang="zh-TW" altLang="en-US" dirty="0">
+              <a:latin typeface="Miriam" panose="020B0502050101010101" pitchFamily="34" charset="-79"/>
+              <a:cs typeface="Miriam" panose="020B0502050101010101" pitchFamily="34" charset="-79"/>
+            </a:endParaRPr>
+          </a:p>
+        </p:txBody>
+      </p:sp>
+      <p:sp>
+        <p:nvSpPr>
+          <p:cNvPr id="3" name="文字版面配置區 2"/>
+          <p:cNvSpPr>
+            <a:spLocks noGrp="1"/>
+          </p:cNvSpPr>
+          <p:nvPr>
+            <p:ph type="body" idx="1"/>
+          </p:nvPr>
+        </p:nvSpPr>
+        <p:spPr/>
+        <p:txBody>
+          <a:bodyPr/>
+          <a:lstStyle/>
+          <a:p>
+            <a:endParaRPr lang="zh-TW" altLang="en-US" dirty="0"/>
+          </a:p>
+        </p:txBody>
+      </p:sp>
+      <p:sp>
+        <p:nvSpPr>
+          <p:cNvPr id="4" name="投影片編號版面配置區 3"/>
+          <p:cNvSpPr>
+            <a:spLocks noGrp="1"/>
+          </p:cNvSpPr>
+          <p:nvPr>
+            <p:ph type="sldNum" idx="12"/>
+          </p:nvPr>
+        </p:nvSpPr>
+        <p:spPr/>
+        <p:txBody>
+          <a:bodyPr/>
+          <a:lstStyle/>
+          <a:p>
+            <a:pPr lvl="0">
+              <a:spcBef>
+                <a:spcPts val="0"/>
+              </a:spcBef>
+              <a:buNone/>
+            </a:pPr>
+            <a:fld id="{00000000-1234-1234-1234-123412341234}" type="slidenum">
+              <a:rPr lang="en" smtClean="0"/>
+              <a:t>18</a:t>
+            </a:fld>
+            <a:endParaRPr lang="en"/>
+          </a:p>
+        </p:txBody>
+      </p:sp>
+      <p:pic>
+        <p:nvPicPr>
+          <p:cNvPr id="5" name="圖片 4"/>
+          <p:cNvPicPr>
+            <a:picLocks noChangeAspect="1"/>
+          </p:cNvPicPr>
+          <p:nvPr/>
+        </p:nvPicPr>
+        <p:blipFill>
+          <a:blip r:embed="rId2">
+            <a:extLst>
+              <a:ext uri="{28A0092B-C50C-407E-A947-70E740481C1C}">
+                <a14:useLocalDpi xmlns:a14="http://schemas.microsoft.com/office/drawing/2010/main" val="0"/>
+              </a:ext>
+            </a:extLst>
+          </a:blip>
+          <a:stretch>
+            <a:fillRect/>
+          </a:stretch>
+        </p:blipFill>
+        <p:spPr>
+          <a:xfrm>
+            <a:off x="3034144" y="1284131"/>
+            <a:ext cx="5529731" cy="3278621"/>
+          </a:xfrm>
+          <a:prstGeom prst="rect">
+            <a:avLst/>
+          </a:prstGeom>
+        </p:spPr>
+      </p:pic>
+    </p:spTree>
+    <p:extLst>
+      <p:ext uri="{BB962C8B-B14F-4D97-AF65-F5344CB8AC3E}">
+        <p14:creationId xmlns:p14="http://schemas.microsoft.com/office/powerpoint/2010/main" val="3556294430"/>
       </p:ext>
     </p:extLst>
   </p:cSld>
@@ -6361,7 +6464,7 @@
                 <a:ea typeface="Calibri" charset="0"/>
                 <a:cs typeface="Miriam" panose="020B0502050101010101" pitchFamily="34" charset="-79"/>
               </a:rPr>
-              <a:t>Use AWS API or EDDA API to query data by either ID or region from cloud server, and transform them into list&lt;Cluster&gt; or list&lt;Resource&gt; type for Conformity monkey and Janitor monkey to use. </a:t>
+              <a:t>Use AWS API or EDDA API to query data by either “ID” or “Region” from cloud server, and transform them into List&lt;Cluster&gt; or List&lt;Resource&gt; type for Conformity monkey and Janitor monkey to use. </a:t>
             </a:r>
           </a:p>
         </p:txBody>
@@ -6443,8 +6546,8 @@
           <a:lstStyle/>
           <a:p>
             <a:r>
-              <a:rPr lang="zh-TW" altLang="en-US" dirty="0" smtClean="0"/>
-              <a:t>文件式註解</a:t>
+              <a:rPr lang="en-US" altLang="zh-TW" dirty="0" smtClean="0"/>
+              <a:t>Annotations</a:t>
             </a:r>
             <a:endParaRPr lang="zh-TW" altLang="en-US" dirty="0"/>
           </a:p>
@@ -6498,10 +6601,40 @@
           </a:p>
         </p:txBody>
       </p:sp>
+      <p:pic>
+        <p:nvPicPr>
+          <p:cNvPr id="5" name="圖片 4"/>
+          <p:cNvPicPr>
+            <a:picLocks noChangeAspect="1"/>
+          </p:cNvPicPr>
+          <p:nvPr/>
+        </p:nvPicPr>
+        <p:blipFill>
+          <a:blip r:embed="rId2">
+            <a:extLst>
+              <a:ext uri="{28A0092B-C50C-407E-A947-70E740481C1C}">
+                <a14:useLocalDpi xmlns:a14="http://schemas.microsoft.com/office/drawing/2010/main" val="0"/>
+              </a:ext>
+            </a:extLst>
+          </a:blip>
+          <a:stretch>
+            <a:fillRect/>
+          </a:stretch>
+        </p:blipFill>
+        <p:spPr>
+          <a:xfrm>
+            <a:off x="1851658" y="1266325"/>
+            <a:ext cx="6620799" cy="3315163"/>
+          </a:xfrm>
+          <a:prstGeom prst="rect">
+            <a:avLst/>
+          </a:prstGeom>
+        </p:spPr>
+      </p:pic>
     </p:spTree>
     <p:extLst>
       <p:ext uri="{BB962C8B-B14F-4D97-AF65-F5344CB8AC3E}">
-        <p14:creationId xmlns:p14="http://schemas.microsoft.com/office/powerpoint/2010/main" val="3746500300"/>
+        <p14:creationId xmlns:p14="http://schemas.microsoft.com/office/powerpoint/2010/main" val="3425992416"/>
       </p:ext>
     </p:extLst>
   </p:cSld>
@@ -6537,6 +6670,54 @@
       </p:grpSpPr>
       <p:sp>
         <p:nvSpPr>
+          <p:cNvPr id="2" name="標題 1"/>
+          <p:cNvSpPr>
+            <a:spLocks noGrp="1"/>
+          </p:cNvSpPr>
+          <p:nvPr>
+            <p:ph type="title"/>
+          </p:nvPr>
+        </p:nvSpPr>
+        <p:spPr/>
+        <p:txBody>
+          <a:bodyPr/>
+          <a:lstStyle/>
+          <a:p>
+            <a:r>
+              <a:rPr lang="en-US" altLang="zh-TW" dirty="0" smtClean="0">
+                <a:latin typeface="Miriam" panose="020B0502050101010101" pitchFamily="34" charset="-79"/>
+                <a:cs typeface="Miriam" panose="020B0502050101010101" pitchFamily="34" charset="-79"/>
+              </a:rPr>
+              <a:t>Javadoc comment</a:t>
+            </a:r>
+            <a:endParaRPr lang="zh-TW" altLang="en-US" dirty="0">
+              <a:latin typeface="Miriam" panose="020B0502050101010101" pitchFamily="34" charset="-79"/>
+              <a:cs typeface="Miriam" panose="020B0502050101010101" pitchFamily="34" charset="-79"/>
+            </a:endParaRPr>
+          </a:p>
+        </p:txBody>
+      </p:sp>
+      <p:sp>
+        <p:nvSpPr>
+          <p:cNvPr id="3" name="文字版面配置區 2"/>
+          <p:cNvSpPr>
+            <a:spLocks noGrp="1"/>
+          </p:cNvSpPr>
+          <p:nvPr>
+            <p:ph type="body" idx="1"/>
+          </p:nvPr>
+        </p:nvSpPr>
+        <p:spPr/>
+        <p:txBody>
+          <a:bodyPr/>
+          <a:lstStyle/>
+          <a:p>
+            <a:endParaRPr lang="zh-TW" altLang="en-US"/>
+          </a:p>
+        </p:txBody>
+      </p:sp>
+      <p:sp>
+        <p:nvSpPr>
           <p:cNvPr id="4" name="投影片編號版面配置區 3"/>
           <p:cNvSpPr>
             <a:spLocks noGrp="1"/>
@@ -6559,6 +6740,72 @@
             <a:fld id="{00000000-1234-1234-1234-123412341234}" type="slidenum">
               <a:rPr lang="en" smtClean="0"/>
               <a:t>21</a:t>
+            </a:fld>
+            <a:endParaRPr lang="en"/>
+          </a:p>
+        </p:txBody>
+      </p:sp>
+    </p:spTree>
+    <p:extLst>
+      <p:ext uri="{BB962C8B-B14F-4D97-AF65-F5344CB8AC3E}">
+        <p14:creationId xmlns:p14="http://schemas.microsoft.com/office/powerpoint/2010/main" val="1554733637"/>
+      </p:ext>
+    </p:extLst>
+  </p:cSld>
+  <p:clrMapOvr>
+    <a:masterClrMapping/>
+  </p:clrMapOvr>
+  <p:timing>
+    <p:tnLst>
+      <p:par>
+        <p:cTn id="1" dur="indefinite" restart="never" nodeType="tmRoot"/>
+      </p:par>
+    </p:tnLst>
+  </p:timing>
+</p:sld>
+</file>
+
+<file path=ppt/slides/slide22.xml><?xml version="1.0" encoding="utf-8"?>
+<p:sld xmlns:a="http://schemas.openxmlformats.org/drawingml/2006/main" xmlns:r="http://schemas.openxmlformats.org/officeDocument/2006/relationships" xmlns:p="http://schemas.openxmlformats.org/presentationml/2006/main">
+  <p:cSld>
+    <p:spTree>
+      <p:nvGrpSpPr>
+        <p:cNvPr id="1" name=""/>
+        <p:cNvGrpSpPr/>
+        <p:nvPr/>
+      </p:nvGrpSpPr>
+      <p:grpSpPr>
+        <a:xfrm>
+          <a:off x="0" y="0"/>
+          <a:ext cx="0" cy="0"/>
+          <a:chOff x="0" y="0"/>
+          <a:chExt cx="0" cy="0"/>
+        </a:xfrm>
+      </p:grpSpPr>
+      <p:sp>
+        <p:nvSpPr>
+          <p:cNvPr id="4" name="投影片編號版面配置區 3"/>
+          <p:cNvSpPr>
+            <a:spLocks noGrp="1"/>
+          </p:cNvSpPr>
+          <p:nvPr>
+            <p:ph type="sldNum" idx="12"/>
+          </p:nvPr>
+        </p:nvSpPr>
+        <p:spPr/>
+        <p:txBody>
+          <a:bodyPr/>
+          <a:lstStyle/>
+          <a:p>
+            <a:pPr lvl="0">
+              <a:spcBef>
+                <a:spcPts val="0"/>
+              </a:spcBef>
+              <a:buNone/>
+            </a:pPr>
+            <a:fld id="{00000000-1234-1234-1234-123412341234}" type="slidenum">
+              <a:rPr lang="en" smtClean="0"/>
+              <a:t>22</a:t>
             </a:fld>
             <a:endParaRPr lang="en"/>
           </a:p>
@@ -6648,28 +6895,9 @@
           <a:p>
             <a:r>
               <a:rPr lang="en-US" altLang="zh-TW" dirty="0" smtClean="0"/>
-              <a:t>Architecture</a:t>
+              <a:t>Simplified Architecture</a:t>
             </a:r>
             <a:endParaRPr lang="zh-TW" altLang="en-US" dirty="0"/>
-          </a:p>
-        </p:txBody>
-      </p:sp>
-      <p:sp>
-        <p:nvSpPr>
-          <p:cNvPr id="3" name="文字版面配置區 2"/>
-          <p:cNvSpPr>
-            <a:spLocks noGrp="1"/>
-          </p:cNvSpPr>
-          <p:nvPr>
-            <p:ph type="body" idx="1"/>
-          </p:nvPr>
-        </p:nvSpPr>
-        <p:spPr/>
-        <p:txBody>
-          <a:bodyPr/>
-          <a:lstStyle/>
-          <a:p>
-            <a:endParaRPr lang="zh-TW" altLang="en-US"/>
           </a:p>
         </p:txBody>
       </p:sp>
@@ -6704,7 +6932,7 @@
       </p:sp>
       <p:pic>
         <p:nvPicPr>
-          <p:cNvPr id="6" name="圖片 5"/>
+          <p:cNvPr id="5" name="圖片 4"/>
           <p:cNvPicPr>
             <a:picLocks noChangeAspect="1"/>
           </p:cNvPicPr>
@@ -6724,8 +6952,38 @@
         </p:blipFill>
         <p:spPr>
           <a:xfrm>
-            <a:off x="2563246" y="414105"/>
-            <a:ext cx="6269054" cy="4445911"/>
+            <a:off x="2993487" y="1479199"/>
+            <a:ext cx="5630061" cy="2876951"/>
+          </a:xfrm>
+          <a:prstGeom prst="rect">
+            <a:avLst/>
+          </a:prstGeom>
+        </p:spPr>
+      </p:pic>
+      <p:pic>
+        <p:nvPicPr>
+          <p:cNvPr id="7" name="圖片 6"/>
+          <p:cNvPicPr>
+            <a:picLocks noChangeAspect="1"/>
+          </p:cNvPicPr>
+          <p:nvPr/>
+        </p:nvPicPr>
+        <p:blipFill>
+          <a:blip r:embed="rId3">
+            <a:extLst>
+              <a:ext uri="{28A0092B-C50C-407E-A947-70E740481C1C}">
+                <a14:useLocalDpi xmlns:a14="http://schemas.microsoft.com/office/drawing/2010/main" val="0"/>
+              </a:ext>
+            </a:extLst>
+          </a:blip>
+          <a:stretch>
+            <a:fillRect/>
+          </a:stretch>
+        </p:blipFill>
+        <p:spPr>
+          <a:xfrm>
+            <a:off x="311700" y="1753759"/>
+            <a:ext cx="2705478" cy="2010056"/>
           </a:xfrm>
           <a:prstGeom prst="rect">
             <a:avLst/>
@@ -6816,21 +7074,14 @@
                 <a:latin typeface="Miriam" panose="020B0502050101010101" pitchFamily="34" charset="-79"/>
                 <a:cs typeface="Miriam" panose="020B0502050101010101" pitchFamily="34" charset="-79"/>
               </a:rPr>
-              <a:t>AWS-</a:t>
-            </a:r>
-            <a:r>
-              <a:rPr lang="en-US" altLang="zh-TW" dirty="0" err="1" smtClean="0">
-                <a:latin typeface="Miriam" panose="020B0502050101010101" pitchFamily="34" charset="-79"/>
-                <a:cs typeface="Miriam" panose="020B0502050101010101" pitchFamily="34" charset="-79"/>
-              </a:rPr>
-              <a:t>besed</a:t>
+              <a:t>AWS-based </a:t>
             </a:r>
             <a:r>
               <a:rPr lang="en-US" altLang="zh-TW" dirty="0" smtClean="0">
                 <a:latin typeface="Miriam" panose="020B0502050101010101" pitchFamily="34" charset="-79"/>
                 <a:cs typeface="Miriam" panose="020B0502050101010101" pitchFamily="34" charset="-79"/>
               </a:rPr>
-              <a:t> :</a:t>
+              <a:t>:</a:t>
             </a:r>
           </a:p>
           <a:p>
@@ -6869,18 +7120,11 @@
               <a:buChar char="Ø"/>
             </a:pPr>
             <a:r>
-              <a:rPr lang="en-US" altLang="zh-TW" dirty="0" smtClean="0">
+              <a:rPr lang="en-US" altLang="zh-TW" smtClean="0">
                 <a:latin typeface="Miriam" panose="020B0502050101010101" pitchFamily="34" charset="-79"/>
                 <a:cs typeface="Miriam" panose="020B0502050101010101" pitchFamily="34" charset="-79"/>
               </a:rPr>
-              <a:t>EDDA-</a:t>
-            </a:r>
-            <a:r>
-              <a:rPr lang="en-US" altLang="zh-TW" dirty="0" err="1" smtClean="0">
-                <a:latin typeface="Miriam" panose="020B0502050101010101" pitchFamily="34" charset="-79"/>
-                <a:cs typeface="Miriam" panose="020B0502050101010101" pitchFamily="34" charset="-79"/>
-              </a:rPr>
-              <a:t>besed</a:t>
+              <a:t>EDDA-based</a:t>
             </a:r>
             <a:r>
               <a:rPr lang="en-US" altLang="zh-TW" dirty="0" smtClean="0">

</xml_diff>